<commit_message>
Adding Downloading Feature, Modifying the UI buttons
</commit_message>
<xml_diff>
--- a/Presentation/BIMgoPPT2.pptx
+++ b/Presentation/BIMgoPPT2.pptx
@@ -1981,33 +1981,33 @@
   </dgm:ptLst>
   <dgm:cxnLst>
     <dgm:cxn modelId="{4CF45697-FE5C-4A61-8F0D-C37820F536B7}" type="presOf" srcId="{93C358B9-5650-497F-B189-108A4C5CC0C3}" destId="{7A642E83-FC58-4084-B748-679EDE9CD8F9}" srcOrd="0" destOrd="0" presId="urn:microsoft.com/office/officeart/2008/layout/HalfCircleOrganizationChart"/>
-    <dgm:cxn modelId="{3BAD3113-CFC9-44C3-A662-1EAF44E15B90}" srcId="{3A6FAD22-8CA0-4024-9DCA-B95E44068907}" destId="{93C358B9-5650-497F-B189-108A4C5CC0C3}" srcOrd="1" destOrd="0" parTransId="{B7D39A6E-7DBB-4CFA-9F3D-7EB28CDD0195}" sibTransId="{00037E7D-28E2-4C41-90CC-885683ED5ACF}"/>
-    <dgm:cxn modelId="{DEF13A4F-A9B9-4D29-8668-434A0E98A05E}" type="presOf" srcId="{EF033732-F32E-488C-BFA6-EF50F6FD7F9B}" destId="{D786EA33-B7B7-4258-AF8B-3D404B8C7922}" srcOrd="0" destOrd="0" presId="urn:microsoft.com/office/officeart/2008/layout/HalfCircleOrganizationChart"/>
+    <dgm:cxn modelId="{64AA835F-9841-4374-A228-41C39E497A46}" srcId="{3A6FAD22-8CA0-4024-9DCA-B95E44068907}" destId="{39EB3552-DA92-4F78-B889-041F37BA2695}" srcOrd="5" destOrd="0" parTransId="{6480C477-03B1-46EA-BCEA-D118F9091B12}" sibTransId="{7B7FEE88-9B4B-4592-906D-4004312B4FB3}"/>
+    <dgm:cxn modelId="{775CE9D1-E155-41FD-A4B0-4895FA250ACC}" srcId="{99E7BCB7-9A61-4AAE-93B4-2C904FFB2359}" destId="{3A6FAD22-8CA0-4024-9DCA-B95E44068907}" srcOrd="0" destOrd="0" parTransId="{819B43B9-8482-4242-AB98-23BDCA7DC6BC}" sibTransId="{4426A6F3-89EE-4BAA-9430-C950990CE6B7}"/>
+    <dgm:cxn modelId="{874E2B5A-41B7-45A7-976A-6BCBA4106185}" type="presOf" srcId="{36B24044-D36B-4ED9-8D80-CD7067BB18AC}" destId="{BE587329-BFBE-417F-B952-951E53DC67D7}" srcOrd="0" destOrd="0" presId="urn:microsoft.com/office/officeart/2008/layout/HalfCircleOrganizationChart"/>
+    <dgm:cxn modelId="{8EEB66A8-4F03-4F20-811A-6F7B46A08511}" type="presOf" srcId="{2F976DB3-1EF7-403B-ABFF-D56626019BF5}" destId="{04C31CB7-EEDC-4EA5-B768-5259559E00D7}" srcOrd="0" destOrd="0" presId="urn:microsoft.com/office/officeart/2008/layout/HalfCircleOrganizationChart"/>
+    <dgm:cxn modelId="{8C40F31A-F2E8-4A62-867A-80C2B2C95AB2}" type="presOf" srcId="{3A6FAD22-8CA0-4024-9DCA-B95E44068907}" destId="{098C0B8F-51D2-4FA4-B41A-7B1E3399E54C}" srcOrd="0" destOrd="0" presId="urn:microsoft.com/office/officeart/2008/layout/HalfCircleOrganizationChart"/>
+    <dgm:cxn modelId="{39DE231B-8AEB-43AE-A31C-65821E706583}" type="presOf" srcId="{00529482-4F4D-4714-8C00-5BC849DE79AC}" destId="{5E3AE8F5-3122-4AF0-A834-E473060356BA}" srcOrd="0" destOrd="0" presId="urn:microsoft.com/office/officeart/2008/layout/HalfCircleOrganizationChart"/>
+    <dgm:cxn modelId="{76CB6461-E33B-49A8-A3C3-02801DB7FE4C}" type="presOf" srcId="{79D2D2C1-DFDA-490D-9B9F-7C5648F11C7A}" destId="{7FA0D090-28BE-44B3-BBEC-1498C342A0D5}" srcOrd="0" destOrd="0" presId="urn:microsoft.com/office/officeart/2008/layout/HalfCircleOrganizationChart"/>
+    <dgm:cxn modelId="{8BDA5420-2D0F-406B-8D97-5F9001E97806}" type="presOf" srcId="{654E9440-386E-4C7B-B28E-164753AC8429}" destId="{A4AAABD9-41C0-406D-A602-1FC1DDDEB5B5}" srcOrd="0" destOrd="0" presId="urn:microsoft.com/office/officeart/2008/layout/HalfCircleOrganizationChart"/>
+    <dgm:cxn modelId="{0C2F9FEC-B06D-4839-8351-6168C657C523}" type="presOf" srcId="{93C358B9-5650-497F-B189-108A4C5CC0C3}" destId="{0B87280E-5AEA-4DEC-B818-A07081ED026F}" srcOrd="1" destOrd="0" presId="urn:microsoft.com/office/officeart/2008/layout/HalfCircleOrganizationChart"/>
+    <dgm:cxn modelId="{2F58C217-DD2E-4998-AACB-BB97DEE0B632}" type="presOf" srcId="{B7D39A6E-7DBB-4CFA-9F3D-7EB28CDD0195}" destId="{5AEDB3DE-BBB3-4E54-AC7C-B1ACC2060E51}" srcOrd="0" destOrd="0" presId="urn:microsoft.com/office/officeart/2008/layout/HalfCircleOrganizationChart"/>
+    <dgm:cxn modelId="{9DC011D5-76A1-45DA-BB27-54A981D07F7F}" type="presOf" srcId="{654E9440-386E-4C7B-B28E-164753AC8429}" destId="{453A199B-C1F4-4FFB-8382-2DFB8C945396}" srcOrd="1" destOrd="0" presId="urn:microsoft.com/office/officeart/2008/layout/HalfCircleOrganizationChart"/>
+    <dgm:cxn modelId="{3E0B96C7-E3B9-447F-AC6F-83F13246EECA}" type="presOf" srcId="{39EB3552-DA92-4F78-B889-041F37BA2695}" destId="{01B372C9-6E8F-44F0-B9E4-CBA09646024B}" srcOrd="1" destOrd="0" presId="urn:microsoft.com/office/officeart/2008/layout/HalfCircleOrganizationChart"/>
+    <dgm:cxn modelId="{FC23470A-5657-4B40-84A5-7F3F81716033}" type="presOf" srcId="{00529482-4F4D-4714-8C00-5BC849DE79AC}" destId="{81D63F28-B893-4ED6-A9E8-02C00BCE457B}" srcOrd="1" destOrd="0" presId="urn:microsoft.com/office/officeart/2008/layout/HalfCircleOrganizationChart"/>
+    <dgm:cxn modelId="{D5787632-0016-4541-8FA9-7BF6993E424E}" srcId="{3A6FAD22-8CA0-4024-9DCA-B95E44068907}" destId="{5936D929-DE0D-4ADF-A68D-8529883AB01D}" srcOrd="3" destOrd="0" parTransId="{2F976DB3-1EF7-403B-ABFF-D56626019BF5}" sibTransId="{81954FBE-3F9E-4BCA-9C10-AD70184BF5B7}"/>
+    <dgm:cxn modelId="{519C648E-CB2F-456D-A8EF-5E441EFF809A}" type="presOf" srcId="{3A6FAD22-8CA0-4024-9DCA-B95E44068907}" destId="{415C2A5B-DBEF-4B47-BF5B-568C78C6A2B5}" srcOrd="1" destOrd="0" presId="urn:microsoft.com/office/officeart/2008/layout/HalfCircleOrganizationChart"/>
     <dgm:cxn modelId="{78D458C1-73B8-48D0-82A5-2C4FA57787FC}" type="presOf" srcId="{5936D929-DE0D-4ADF-A68D-8529883AB01D}" destId="{40D77DF3-2330-4042-94A2-FEEEC4A2B431}" srcOrd="0" destOrd="0" presId="urn:microsoft.com/office/officeart/2008/layout/HalfCircleOrganizationChart"/>
     <dgm:cxn modelId="{03AD3CC7-A8FC-4326-AB28-3903553C5A3C}" type="presOf" srcId="{E5354B98-8B1E-4165-8E83-BAF7C8C243CF}" destId="{2C377BE0-34D8-4D07-BD5C-8D413257AEA9}" srcOrd="0" destOrd="0" presId="urn:microsoft.com/office/officeart/2008/layout/HalfCircleOrganizationChart"/>
-    <dgm:cxn modelId="{76CB6461-E33B-49A8-A3C3-02801DB7FE4C}" type="presOf" srcId="{79D2D2C1-DFDA-490D-9B9F-7C5648F11C7A}" destId="{7FA0D090-28BE-44B3-BBEC-1498C342A0D5}" srcOrd="0" destOrd="0" presId="urn:microsoft.com/office/officeart/2008/layout/HalfCircleOrganizationChart"/>
+    <dgm:cxn modelId="{DECB9D10-05E1-4C65-BAD8-CF96741EA2A5}" type="presOf" srcId="{39EB3552-DA92-4F78-B889-041F37BA2695}" destId="{9869D873-8A18-4A03-A050-AB95CA4E7099}" srcOrd="0" destOrd="0" presId="urn:microsoft.com/office/officeart/2008/layout/HalfCircleOrganizationChart"/>
+    <dgm:cxn modelId="{3BAD3113-CFC9-44C3-A662-1EAF44E15B90}" srcId="{3A6FAD22-8CA0-4024-9DCA-B95E44068907}" destId="{93C358B9-5650-497F-B189-108A4C5CC0C3}" srcOrd="1" destOrd="0" parTransId="{B7D39A6E-7DBB-4CFA-9F3D-7EB28CDD0195}" sibTransId="{00037E7D-28E2-4C41-90CC-885683ED5ACF}"/>
     <dgm:cxn modelId="{98EE9B53-6576-4D29-A09F-71D3BEFA82F6}" srcId="{3A6FAD22-8CA0-4024-9DCA-B95E44068907}" destId="{654E9440-386E-4C7B-B28E-164753AC8429}" srcOrd="0" destOrd="0" parTransId="{36B24044-D36B-4ED9-8D80-CD7067BB18AC}" sibTransId="{FCFF423C-6D11-43ED-ABE1-3EE899D58A71}"/>
-    <dgm:cxn modelId="{FC23470A-5657-4B40-84A5-7F3F81716033}" type="presOf" srcId="{00529482-4F4D-4714-8C00-5BC849DE79AC}" destId="{81D63F28-B893-4ED6-A9E8-02C00BCE457B}" srcOrd="1" destOrd="0" presId="urn:microsoft.com/office/officeart/2008/layout/HalfCircleOrganizationChart"/>
     <dgm:cxn modelId="{C03AA05D-D5B1-4378-9178-791D4909C2E8}" srcId="{3A6FAD22-8CA0-4024-9DCA-B95E44068907}" destId="{EF033732-F32E-488C-BFA6-EF50F6FD7F9B}" srcOrd="4" destOrd="0" parTransId="{E5354B98-8B1E-4165-8E83-BAF7C8C243CF}" sibTransId="{951F003F-4303-41D1-AAD5-C25CEDBBB30C}"/>
-    <dgm:cxn modelId="{3E0B96C7-E3B9-447F-AC6F-83F13246EECA}" type="presOf" srcId="{39EB3552-DA92-4F78-B889-041F37BA2695}" destId="{01B372C9-6E8F-44F0-B9E4-CBA09646024B}" srcOrd="1" destOrd="0" presId="urn:microsoft.com/office/officeart/2008/layout/HalfCircleOrganizationChart"/>
-    <dgm:cxn modelId="{8BDA5420-2D0F-406B-8D97-5F9001E97806}" type="presOf" srcId="{654E9440-386E-4C7B-B28E-164753AC8429}" destId="{A4AAABD9-41C0-406D-A602-1FC1DDDEB5B5}" srcOrd="0" destOrd="0" presId="urn:microsoft.com/office/officeart/2008/layout/HalfCircleOrganizationChart"/>
+    <dgm:cxn modelId="{6F999D19-C19B-4A21-8777-138F60FCC446}" type="presOf" srcId="{6480C477-03B1-46EA-BCEA-D118F9091B12}" destId="{2DD5B668-3867-4437-8689-3DFD6CB33EA8}" srcOrd="0" destOrd="0" presId="urn:microsoft.com/office/officeart/2008/layout/HalfCircleOrganizationChart"/>
     <dgm:cxn modelId="{5DDB39C6-08A4-4A06-8E58-2FC9EF3B7040}" srcId="{3A6FAD22-8CA0-4024-9DCA-B95E44068907}" destId="{00529482-4F4D-4714-8C00-5BC849DE79AC}" srcOrd="2" destOrd="0" parTransId="{79D2D2C1-DFDA-490D-9B9F-7C5648F11C7A}" sibTransId="{A7740B9E-23CC-4A70-A8BF-A32BB5C66992}"/>
-    <dgm:cxn modelId="{8EEB66A8-4F03-4F20-811A-6F7B46A08511}" type="presOf" srcId="{2F976DB3-1EF7-403B-ABFF-D56626019BF5}" destId="{04C31CB7-EEDC-4EA5-B768-5259559E00D7}" srcOrd="0" destOrd="0" presId="urn:microsoft.com/office/officeart/2008/layout/HalfCircleOrganizationChart"/>
-    <dgm:cxn modelId="{39DE231B-8AEB-43AE-A31C-65821E706583}" type="presOf" srcId="{00529482-4F4D-4714-8C00-5BC849DE79AC}" destId="{5E3AE8F5-3122-4AF0-A834-E473060356BA}" srcOrd="0" destOrd="0" presId="urn:microsoft.com/office/officeart/2008/layout/HalfCircleOrganizationChart"/>
-    <dgm:cxn modelId="{874E2B5A-41B7-45A7-976A-6BCBA4106185}" type="presOf" srcId="{36B24044-D36B-4ED9-8D80-CD7067BB18AC}" destId="{BE587329-BFBE-417F-B952-951E53DC67D7}" srcOrd="0" destOrd="0" presId="urn:microsoft.com/office/officeart/2008/layout/HalfCircleOrganizationChart"/>
+    <dgm:cxn modelId="{DEF13A4F-A9B9-4D29-8668-434A0E98A05E}" type="presOf" srcId="{EF033732-F32E-488C-BFA6-EF50F6FD7F9B}" destId="{D786EA33-B7B7-4258-AF8B-3D404B8C7922}" srcOrd="0" destOrd="0" presId="urn:microsoft.com/office/officeart/2008/layout/HalfCircleOrganizationChart"/>
     <dgm:cxn modelId="{722391E9-4685-47C6-9258-E3B03E462BC9}" type="presOf" srcId="{5936D929-DE0D-4ADF-A68D-8529883AB01D}" destId="{A3DFFE0B-41BC-4632-9353-B34DA99686A0}" srcOrd="1" destOrd="0" presId="urn:microsoft.com/office/officeart/2008/layout/HalfCircleOrganizationChart"/>
-    <dgm:cxn modelId="{D5787632-0016-4541-8FA9-7BF6993E424E}" srcId="{3A6FAD22-8CA0-4024-9DCA-B95E44068907}" destId="{5936D929-DE0D-4ADF-A68D-8529883AB01D}" srcOrd="3" destOrd="0" parTransId="{2F976DB3-1EF7-403B-ABFF-D56626019BF5}" sibTransId="{81954FBE-3F9E-4BCA-9C10-AD70184BF5B7}"/>
-    <dgm:cxn modelId="{64AA835F-9841-4374-A228-41C39E497A46}" srcId="{3A6FAD22-8CA0-4024-9DCA-B95E44068907}" destId="{39EB3552-DA92-4F78-B889-041F37BA2695}" srcOrd="5" destOrd="0" parTransId="{6480C477-03B1-46EA-BCEA-D118F9091B12}" sibTransId="{7B7FEE88-9B4B-4592-906D-4004312B4FB3}"/>
-    <dgm:cxn modelId="{6F999D19-C19B-4A21-8777-138F60FCC446}" type="presOf" srcId="{6480C477-03B1-46EA-BCEA-D118F9091B12}" destId="{2DD5B668-3867-4437-8689-3DFD6CB33EA8}" srcOrd="0" destOrd="0" presId="urn:microsoft.com/office/officeart/2008/layout/HalfCircleOrganizationChart"/>
-    <dgm:cxn modelId="{0C2F9FEC-B06D-4839-8351-6168C657C523}" type="presOf" srcId="{93C358B9-5650-497F-B189-108A4C5CC0C3}" destId="{0B87280E-5AEA-4DEC-B818-A07081ED026F}" srcOrd="1" destOrd="0" presId="urn:microsoft.com/office/officeart/2008/layout/HalfCircleOrganizationChart"/>
-    <dgm:cxn modelId="{519C648E-CB2F-456D-A8EF-5E441EFF809A}" type="presOf" srcId="{3A6FAD22-8CA0-4024-9DCA-B95E44068907}" destId="{415C2A5B-DBEF-4B47-BF5B-568C78C6A2B5}" srcOrd="1" destOrd="0" presId="urn:microsoft.com/office/officeart/2008/layout/HalfCircleOrganizationChart"/>
-    <dgm:cxn modelId="{775CE9D1-E155-41FD-A4B0-4895FA250ACC}" srcId="{99E7BCB7-9A61-4AAE-93B4-2C904FFB2359}" destId="{3A6FAD22-8CA0-4024-9DCA-B95E44068907}" srcOrd="0" destOrd="0" parTransId="{819B43B9-8482-4242-AB98-23BDCA7DC6BC}" sibTransId="{4426A6F3-89EE-4BAA-9430-C950990CE6B7}"/>
     <dgm:cxn modelId="{07652CBC-F36F-4DB4-A385-CE20408696AA}" type="presOf" srcId="{99E7BCB7-9A61-4AAE-93B4-2C904FFB2359}" destId="{0E38CE18-E08C-4653-B70B-87B692BF4B1D}" srcOrd="0" destOrd="0" presId="urn:microsoft.com/office/officeart/2008/layout/HalfCircleOrganizationChart"/>
     <dgm:cxn modelId="{3395E623-3780-4E7D-AD00-C39D932D0553}" type="presOf" srcId="{EF033732-F32E-488C-BFA6-EF50F6FD7F9B}" destId="{8797D750-A89A-4535-921B-5FB9C5C97669}" srcOrd="1" destOrd="0" presId="urn:microsoft.com/office/officeart/2008/layout/HalfCircleOrganizationChart"/>
-    <dgm:cxn modelId="{8C40F31A-F2E8-4A62-867A-80C2B2C95AB2}" type="presOf" srcId="{3A6FAD22-8CA0-4024-9DCA-B95E44068907}" destId="{098C0B8F-51D2-4FA4-B41A-7B1E3399E54C}" srcOrd="0" destOrd="0" presId="urn:microsoft.com/office/officeart/2008/layout/HalfCircleOrganizationChart"/>
-    <dgm:cxn modelId="{9DC011D5-76A1-45DA-BB27-54A981D07F7F}" type="presOf" srcId="{654E9440-386E-4C7B-B28E-164753AC8429}" destId="{453A199B-C1F4-4FFB-8382-2DFB8C945396}" srcOrd="1" destOrd="0" presId="urn:microsoft.com/office/officeart/2008/layout/HalfCircleOrganizationChart"/>
-    <dgm:cxn modelId="{2F58C217-DD2E-4998-AACB-BB97DEE0B632}" type="presOf" srcId="{B7D39A6E-7DBB-4CFA-9F3D-7EB28CDD0195}" destId="{5AEDB3DE-BBB3-4E54-AC7C-B1ACC2060E51}" srcOrd="0" destOrd="0" presId="urn:microsoft.com/office/officeart/2008/layout/HalfCircleOrganizationChart"/>
-    <dgm:cxn modelId="{DECB9D10-05E1-4C65-BAD8-CF96741EA2A5}" type="presOf" srcId="{39EB3552-DA92-4F78-B889-041F37BA2695}" destId="{9869D873-8A18-4A03-A050-AB95CA4E7099}" srcOrd="0" destOrd="0" presId="urn:microsoft.com/office/officeart/2008/layout/HalfCircleOrganizationChart"/>
     <dgm:cxn modelId="{E7391BE7-2B98-4BCF-B2D8-7F816896237C}" type="presParOf" srcId="{0E38CE18-E08C-4653-B70B-87B692BF4B1D}" destId="{E5FDDA83-C435-4DBB-BC7C-2D6D6ADA3D49}" srcOrd="0" destOrd="0" presId="urn:microsoft.com/office/officeart/2008/layout/HalfCircleOrganizationChart"/>
     <dgm:cxn modelId="{235F8E92-997D-43AD-971B-DA53864D5CBF}" type="presParOf" srcId="{E5FDDA83-C435-4DBB-BC7C-2D6D6ADA3D49}" destId="{A68379AF-5511-4DF6-9F3E-30E9C4006E69}" srcOrd="0" destOrd="0" presId="urn:microsoft.com/office/officeart/2008/layout/HalfCircleOrganizationChart"/>
     <dgm:cxn modelId="{B169D4B9-DF0E-465F-8A43-4957DC73B41A}" type="presParOf" srcId="{A68379AF-5511-4DF6-9F3E-30E9C4006E69}" destId="{098C0B8F-51D2-4FA4-B41A-7B1E3399E54C}" srcOrd="0" destOrd="0" presId="urn:microsoft.com/office/officeart/2008/layout/HalfCircleOrganizationChart"/>
@@ -6336,7 +6336,7 @@
             <a:fld id="{B61BEF0D-F0BB-DE4B-95CE-6DB70DBA9567}" type="datetimeFigureOut">
               <a:rPr lang="en-US" dirty="0"/>
               <a:pPr/>
-              <a:t>20-06-18</a:t>
+              <a:t>6/20/2018</a:t>
             </a:fld>
             <a:endParaRPr lang="en-US" dirty="0"/>
           </a:p>
@@ -6629,7 +6629,7 @@
             <a:fld id="{B61BEF0D-F0BB-DE4B-95CE-6DB70DBA9567}" type="datetimeFigureOut">
               <a:rPr lang="en-US" dirty="0"/>
               <a:pPr/>
-              <a:t>20-06-18</a:t>
+              <a:t>6/20/2018</a:t>
             </a:fld>
             <a:endParaRPr lang="en-US" dirty="0"/>
           </a:p>
@@ -6874,7 +6874,7 @@
             <a:fld id="{B61BEF0D-F0BB-DE4B-95CE-6DB70DBA9567}" type="datetimeFigureOut">
               <a:rPr lang="en-US" dirty="0"/>
               <a:pPr/>
-              <a:t>20-06-18</a:t>
+              <a:t>6/20/2018</a:t>
             </a:fld>
             <a:endParaRPr lang="en-US" dirty="0"/>
           </a:p>
@@ -7411,7 +7411,7 @@
             <a:fld id="{B61BEF0D-F0BB-DE4B-95CE-6DB70DBA9567}" type="datetimeFigureOut">
               <a:rPr lang="en-US" dirty="0"/>
               <a:pPr/>
-              <a:t>20-06-18</a:t>
+              <a:t>6/20/2018</a:t>
             </a:fld>
             <a:endParaRPr lang="en-US" dirty="0"/>
           </a:p>
@@ -7656,7 +7656,7 @@
             <a:fld id="{B61BEF0D-F0BB-DE4B-95CE-6DB70DBA9567}" type="datetimeFigureOut">
               <a:rPr lang="en-US" dirty="0"/>
               <a:pPr/>
-              <a:t>20-06-18</a:t>
+              <a:t>6/20/2018</a:t>
             </a:fld>
             <a:endParaRPr lang="en-US" dirty="0"/>
           </a:p>
@@ -8185,7 +8185,7 @@
             <a:fld id="{B61BEF0D-F0BB-DE4B-95CE-6DB70DBA9567}" type="datetimeFigureOut">
               <a:rPr lang="en-US" dirty="0"/>
               <a:pPr/>
-              <a:t>20-06-18</a:t>
+              <a:t>6/20/2018</a:t>
             </a:fld>
             <a:endParaRPr lang="en-US" dirty="0"/>
           </a:p>
@@ -8479,7 +8479,7 @@
             <a:fld id="{B61BEF0D-F0BB-DE4B-95CE-6DB70DBA9567}" type="datetimeFigureOut">
               <a:rPr lang="en-US" dirty="0"/>
               <a:pPr/>
-              <a:t>20-06-18</a:t>
+              <a:t>6/20/2018</a:t>
             </a:fld>
             <a:endParaRPr lang="en-US" dirty="0"/>
           </a:p>
@@ -8650,7 +8650,7 @@
             <a:fld id="{B61BEF0D-F0BB-DE4B-95CE-6DB70DBA9567}" type="datetimeFigureOut">
               <a:rPr lang="en-US" dirty="0"/>
               <a:pPr/>
-              <a:t>20-06-18</a:t>
+              <a:t>6/20/2018</a:t>
             </a:fld>
             <a:endParaRPr lang="en-US" dirty="0"/>
           </a:p>
@@ -8827,7 +8827,7 @@
             <a:fld id="{B61BEF0D-F0BB-DE4B-95CE-6DB70DBA9567}" type="datetimeFigureOut">
               <a:rPr lang="en-US" dirty="0"/>
               <a:pPr/>
-              <a:t>20-06-18</a:t>
+              <a:t>6/20/2018</a:t>
             </a:fld>
             <a:endParaRPr lang="en-US" dirty="0"/>
           </a:p>
@@ -8994,7 +8994,7 @@
             <a:fld id="{B61BEF0D-F0BB-DE4B-95CE-6DB70DBA9567}" type="datetimeFigureOut">
               <a:rPr lang="en-US" dirty="0"/>
               <a:pPr/>
-              <a:t>20-06-18</a:t>
+              <a:t>6/20/2018</a:t>
             </a:fld>
             <a:endParaRPr lang="en-US" dirty="0"/>
           </a:p>
@@ -9242,7 +9242,7 @@
             <a:fld id="{B61BEF0D-F0BB-DE4B-95CE-6DB70DBA9567}" type="datetimeFigureOut">
               <a:rPr lang="en-US" dirty="0"/>
               <a:pPr/>
-              <a:t>20-06-18</a:t>
+              <a:t>6/20/2018</a:t>
             </a:fld>
             <a:endParaRPr lang="en-US" dirty="0"/>
           </a:p>
@@ -9536,7 +9536,7 @@
             <a:fld id="{B61BEF0D-F0BB-DE4B-95CE-6DB70DBA9567}" type="datetimeFigureOut">
               <a:rPr lang="en-US" dirty="0"/>
               <a:pPr/>
-              <a:t>20-06-18</a:t>
+              <a:t>6/20/2018</a:t>
             </a:fld>
             <a:endParaRPr lang="en-US" dirty="0"/>
           </a:p>
@@ -9975,7 +9975,7 @@
             <a:fld id="{B61BEF0D-F0BB-DE4B-95CE-6DB70DBA9567}" type="datetimeFigureOut">
               <a:rPr lang="en-US" dirty="0"/>
               <a:pPr/>
-              <a:t>20-06-18</a:t>
+              <a:t>6/20/2018</a:t>
             </a:fld>
             <a:endParaRPr lang="en-US" dirty="0"/>
           </a:p>
@@ -10090,7 +10090,7 @@
             <a:fld id="{B61BEF0D-F0BB-DE4B-95CE-6DB70DBA9567}" type="datetimeFigureOut">
               <a:rPr lang="en-US" dirty="0"/>
               <a:pPr/>
-              <a:t>20-06-18</a:t>
+              <a:t>6/20/2018</a:t>
             </a:fld>
             <a:endParaRPr lang="en-US" dirty="0"/>
           </a:p>
@@ -10182,7 +10182,7 @@
             <a:fld id="{B61BEF0D-F0BB-DE4B-95CE-6DB70DBA9567}" type="datetimeFigureOut">
               <a:rPr lang="en-US" dirty="0"/>
               <a:pPr/>
-              <a:t>20-06-18</a:t>
+              <a:t>6/20/2018</a:t>
             </a:fld>
             <a:endParaRPr lang="en-US" dirty="0"/>
           </a:p>
@@ -10462,7 +10462,7 @@
             <a:fld id="{B61BEF0D-F0BB-DE4B-95CE-6DB70DBA9567}" type="datetimeFigureOut">
               <a:rPr lang="en-US" dirty="0"/>
               <a:pPr/>
-              <a:t>20-06-18</a:t>
+              <a:t>6/20/2018</a:t>
             </a:fld>
             <a:endParaRPr lang="en-US" dirty="0"/>
           </a:p>
@@ -10750,7 +10750,7 @@
             <a:fld id="{B61BEF0D-F0BB-DE4B-95CE-6DB70DBA9567}" type="datetimeFigureOut">
               <a:rPr lang="en-US" dirty="0"/>
               <a:pPr/>
-              <a:t>20-06-18</a:t>
+              <a:t>6/20/2018</a:t>
             </a:fld>
             <a:endParaRPr lang="en-US" dirty="0"/>
           </a:p>
@@ -11277,7 +11277,7 @@
             <a:fld id="{B61BEF0D-F0BB-DE4B-95CE-6DB70DBA9567}" type="datetimeFigureOut">
               <a:rPr lang="en-US" dirty="0"/>
               <a:pPr/>
-              <a:t>20-06-18</a:t>
+              <a:t>6/20/2018</a:t>
             </a:fld>
             <a:endParaRPr lang="en-US" dirty="0"/>
           </a:p>
@@ -12195,15 +12195,7 @@
                   <a:srgbClr val="333333"/>
                 </a:solidFill>
               </a:rPr>
-              <a:t>to </a:t>
-            </a:r>
-            <a:r>
-              <a:rPr lang="en-US" sz="2800" dirty="0">
-                <a:solidFill>
-                  <a:srgbClr val="333333"/>
-                </a:solidFill>
-              </a:rPr>
-              <a:t>make up </a:t>
+              <a:t>to make up </a:t>
             </a:r>
             <a:r>
               <a:rPr lang="en-US" sz="2800" dirty="0" smtClean="0">
@@ -13845,8 +13837,37 @@
                   <a:srgbClr val="333333"/>
                 </a:solidFill>
               </a:rPr>
-              <a:t> One person uses more than one device</a:t>
-            </a:r>
+              <a:t> One person </a:t>
+            </a:r>
+            <a:r>
+              <a:rPr lang="en-US" sz="2800" dirty="0" smtClean="0">
+                <a:solidFill>
+                  <a:srgbClr val="333333"/>
+                </a:solidFill>
+              </a:rPr>
+              <a:t>needs to use </a:t>
+            </a:r>
+            <a:r>
+              <a:rPr lang="en-US" sz="2800" dirty="0" smtClean="0">
+                <a:solidFill>
+                  <a:srgbClr val="333333"/>
+                </a:solidFill>
+              </a:rPr>
+              <a:t>more than </a:t>
+            </a:r>
+            <a:r>
+              <a:rPr lang="en-US" sz="2800" dirty="0" smtClean="0">
+                <a:solidFill>
+                  <a:srgbClr val="333333"/>
+                </a:solidFill>
+              </a:rPr>
+              <a:t>device</a:t>
+            </a:r>
+            <a:endParaRPr lang="en-US" sz="2800" dirty="0" smtClean="0">
+              <a:solidFill>
+                <a:srgbClr val="333333"/>
+              </a:solidFill>
+            </a:endParaRPr>
           </a:p>
           <a:p>
             <a:pPr>

</xml_diff>